<commit_message>
modified:   Documents/presentation doc/App Structure.pptx 	modified:   Documents/proposal/Project plan.xlsx
</commit_message>
<xml_diff>
--- a/Documents/presentation doc/App Structure.pptx
+++ b/Documents/presentation doc/App Structure.pptx
@@ -4202,8 +4202,8 @@
               <a:t>PC -&gt; Android : </a:t>
             </a:r>
             <a:r>
-              <a:rPr lang="ko-KR" altLang="en-US" dirty="0" smtClean="0"/>
-              <a:t>텍스트</a:t>
+              <a:rPr lang="en-US" altLang="ko-KR" dirty="0" smtClean="0"/>
+              <a:t>Input Data</a:t>
             </a:r>
             <a:endParaRPr lang="en-US" altLang="ko-KR" dirty="0" smtClean="0"/>
           </a:p>
@@ -5748,63 +5748,6 @@
           </a:extLst>
         </p:spPr>
       </p:cxnSp>
-      <p:cxnSp>
-        <p:nvCxnSpPr>
-          <p:cNvPr id="27" name="직선 화살표 연결선 26"/>
-          <p:cNvCxnSpPr>
-            <a:stCxn id="19" idx="3"/>
-            <a:endCxn id="6" idx="1"/>
-          </p:cNvCxnSpPr>
-          <p:nvPr/>
-        </p:nvCxnSpPr>
-        <p:spPr bwMode="auto">
-          <a:xfrm flipV="1">
-            <a:off x="5689451" y="2579640"/>
-            <a:ext cx="826764" cy="1398305"/>
-          </a:xfrm>
-          <a:prstGeom prst="straightConnector1">
-            <a:avLst/>
-          </a:prstGeom>
-          <a:gradFill rotWithShape="1">
-            <a:gsLst>
-              <a:gs pos="0">
-                <a:schemeClr val="bg2">
-                  <a:gamma/>
-                  <a:tint val="26667"/>
-                  <a:invGamma/>
-                </a:schemeClr>
-              </a:gs>
-              <a:gs pos="100000">
-                <a:schemeClr val="bg2">
-                  <a:alpha val="14999"/>
-                </a:schemeClr>
-              </a:gs>
-            </a:gsLst>
-            <a:lin ang="5400000" scaled="1"/>
-          </a:gradFill>
-          <a:ln w="38100" cap="flat" cmpd="sng" algn="ctr">
-            <a:solidFill>
-              <a:srgbClr val="000000"/>
-            </a:solidFill>
-            <a:prstDash val="solid"/>
-            <a:round/>
-            <a:headEnd type="none" w="med" len="med"/>
-            <a:tailEnd type="none" w="med" len="med"/>
-          </a:ln>
-          <a:effectLst/>
-          <a:extLst>
-            <a:ext uri="{AF507438-7753-43E0-B8FC-AC1667EBCBE1}">
-              <a14:hiddenEffects xmlns:a14="http://schemas.microsoft.com/office/drawing/2010/main">
-                <a:effectLst>
-                  <a:outerShdw dist="35921" dir="2700000" algn="ctr" rotWithShape="0">
-                    <a:schemeClr val="bg2"/>
-                  </a:outerShdw>
-                </a:effectLst>
-              </a14:hiddenEffects>
-            </a:ext>
-          </a:extLst>
-        </p:spPr>
-      </p:cxnSp>
       <p:sp>
         <p:nvSpPr>
           <p:cNvPr id="66" name="직사각형 65"/>
@@ -6969,65 +6912,6 @@
           </a:p>
         </p:txBody>
       </p:sp>
-      <p:cxnSp>
-        <p:nvCxnSpPr>
-          <p:cNvPr id="26" name="꺾인 연결선 25"/>
-          <p:cNvCxnSpPr>
-            <a:stCxn id="6" idx="3"/>
-            <a:endCxn id="20" idx="3"/>
-          </p:cNvCxnSpPr>
-          <p:nvPr/>
-        </p:nvCxnSpPr>
-        <p:spPr bwMode="auto">
-          <a:xfrm>
-            <a:off x="7380312" y="3068960"/>
-            <a:ext cx="12700" cy="2304256"/>
-          </a:xfrm>
-          <a:prstGeom prst="bentConnector3">
-            <a:avLst>
-              <a:gd name="adj1" fmla="val 1800000"/>
-            </a:avLst>
-          </a:prstGeom>
-          <a:gradFill rotWithShape="1">
-            <a:gsLst>
-              <a:gs pos="0">
-                <a:schemeClr val="bg2">
-                  <a:gamma/>
-                  <a:tint val="26667"/>
-                  <a:invGamma/>
-                </a:schemeClr>
-              </a:gs>
-              <a:gs pos="100000">
-                <a:schemeClr val="bg2">
-                  <a:alpha val="14999"/>
-                </a:schemeClr>
-              </a:gs>
-            </a:gsLst>
-            <a:lin ang="5400000" scaled="1"/>
-          </a:gradFill>
-          <a:ln w="38100" cap="flat" cmpd="sng" algn="ctr">
-            <a:solidFill>
-              <a:srgbClr val="000000"/>
-            </a:solidFill>
-            <a:prstDash val="solid"/>
-            <a:round/>
-            <a:headEnd type="none" w="med" len="med"/>
-            <a:tailEnd type="none" w="med" len="med"/>
-          </a:ln>
-          <a:effectLst/>
-          <a:extLst>
-            <a:ext uri="{AF507438-7753-43E0-B8FC-AC1667EBCBE1}">
-              <a14:hiddenEffects xmlns:a14="http://schemas.microsoft.com/office/drawing/2010/main">
-                <a:effectLst>
-                  <a:outerShdw dist="35921" dir="2700000" algn="ctr" rotWithShape="0">
-                    <a:schemeClr val="bg2"/>
-                  </a:outerShdw>
-                </a:effectLst>
-              </a14:hiddenEffects>
-            </a:ext>
-          </a:extLst>
-        </p:spPr>
-      </p:cxnSp>
     </p:spTree>
     <p:extLst>
       <p:ext uri="{BB962C8B-B14F-4D97-AF65-F5344CB8AC3E}">
@@ -7166,7 +7050,7 @@
         </p:blipFill>
         <p:spPr bwMode="auto">
           <a:xfrm>
-            <a:off x="50180" y="1124744"/>
+            <a:off x="122188" y="1124744"/>
             <a:ext cx="8914308" cy="5589240"/>
           </a:xfrm>
           <a:prstGeom prst="rect">

</xml_diff>